<commit_message>
Project overview - WBS added
</commit_message>
<xml_diff>
--- a/Traffic Violations Analytics Overview.pptx
+++ b/Traffic Violations Analytics Overview.pptx
@@ -7,7 +7,7 @@
   <p:sldIdLst>
     <p:sldId id="256" r:id="rId2"/>
     <p:sldId id="257" r:id="rId3"/>
-    <p:sldId id="263" r:id="rId4"/>
+    <p:sldId id="264" r:id="rId4"/>
     <p:sldId id="259" r:id="rId5"/>
     <p:sldId id="260" r:id="rId6"/>
     <p:sldId id="262" r:id="rId7"/>
@@ -5884,14 +5884,19 @@
             <p:ph type="title"/>
           </p:nvPr>
         </p:nvSpPr>
-        <p:spPr/>
+        <p:spPr>
+          <a:xfrm>
+            <a:off x="779463" y="213880"/>
+            <a:ext cx="7583487" cy="1044388"/>
+          </a:xfrm>
+        </p:spPr>
         <p:txBody>
           <a:bodyPr/>
           <a:lstStyle/>
           <a:p>
             <a:r>
-              <a:rPr lang="en-US" dirty="0" smtClean="0"/>
-              <a:t>Data Sources</a:t>
+              <a:rPr lang="en-US" sz="3600" dirty="0" smtClean="0"/>
+              <a:t>Work Breakdown Structure (WBS)</a:t>
             </a:r>
             <a:endParaRPr lang="en-US" dirty="0"/>
           </a:p>
@@ -5907,25 +5912,307 @@
             <p:ph idx="1"/>
           </p:nvPr>
         </p:nvSpPr>
-        <p:spPr/>
-        <p:txBody>
-          <a:bodyPr/>
+        <p:spPr>
+          <a:xfrm>
+            <a:off x="317490" y="1532043"/>
+            <a:ext cx="8619260" cy="5069013"/>
+          </a:xfrm>
+        </p:spPr>
+        <p:txBody>
+          <a:bodyPr>
+            <a:noAutofit/>
+          </a:bodyPr>
           <a:lstStyle/>
           <a:p>
-            <a:endParaRPr lang="en-US"/>
+            <a:pPr>
+              <a:spcBef>
+                <a:spcPts val="1500"/>
+              </a:spcBef>
+            </a:pPr>
+            <a:r>
+              <a:rPr lang="en-US" sz="1400" dirty="0" smtClean="0">
+                <a:solidFill>
+                  <a:srgbClr val="FFFFFF"/>
+                </a:solidFill>
+              </a:rPr>
+              <a:t>Are </a:t>
+            </a:r>
+            <a:r>
+              <a:rPr lang="en-US" sz="1400" dirty="0" smtClean="0">
+                <a:solidFill>
+                  <a:srgbClr val="FFFFFF"/>
+                </a:solidFill>
+              </a:rPr>
+              <a:t>men the biggest offenders or women?  If so, is that because more men drive or women</a:t>
+            </a:r>
+            <a:r>
+              <a:rPr lang="en-US" sz="1400" dirty="0" smtClean="0">
+                <a:solidFill>
+                  <a:srgbClr val="FFFFFF"/>
+                </a:solidFill>
+              </a:rPr>
+              <a:t>? </a:t>
+            </a:r>
+            <a:r>
+              <a:rPr lang="en-US" sz="1400" dirty="0">
+                <a:solidFill>
+                  <a:srgbClr val="FFFFFF"/>
+                </a:solidFill>
+              </a:rPr>
+              <a:t> </a:t>
+            </a:r>
+            <a:r>
+              <a:rPr lang="en-US" sz="1400" dirty="0" smtClean="0">
+                <a:solidFill>
+                  <a:srgbClr val="FFFFFF"/>
+                </a:solidFill>
+              </a:rPr>
+              <a:t>This will apply to all the tasks below. </a:t>
+            </a:r>
+            <a:endParaRPr lang="en-US" sz="1400" dirty="0" smtClean="0">
+              <a:solidFill>
+                <a:srgbClr val="FFFFFF"/>
+              </a:solidFill>
+            </a:endParaRPr>
+          </a:p>
+          <a:p>
+            <a:pPr>
+              <a:spcBef>
+                <a:spcPts val="1500"/>
+              </a:spcBef>
+            </a:pPr>
+            <a:r>
+              <a:rPr lang="en-US" sz="1400" dirty="0" smtClean="0">
+                <a:solidFill>
+                  <a:srgbClr val="FFFFFF"/>
+                </a:solidFill>
+              </a:rPr>
+              <a:t>Simon - What </a:t>
+            </a:r>
+            <a:r>
+              <a:rPr lang="en-US" sz="1400" dirty="0" smtClean="0">
+                <a:solidFill>
+                  <a:srgbClr val="FFFFFF"/>
+                </a:solidFill>
+              </a:rPr>
+              <a:t>is the heavy period in the day for traffic citations?  Morning or evening rush hour, driving hungry at noon or coming home after a night out?</a:t>
+            </a:r>
+          </a:p>
+          <a:p>
+            <a:pPr>
+              <a:spcBef>
+                <a:spcPts val="1500"/>
+              </a:spcBef>
+            </a:pPr>
+            <a:r>
+              <a:rPr lang="en-US" sz="1400" dirty="0" err="1" smtClean="0">
+                <a:solidFill>
+                  <a:srgbClr val="FFFFFF"/>
+                </a:solidFill>
+              </a:rPr>
+              <a:t>Parno</a:t>
+            </a:r>
+            <a:r>
+              <a:rPr lang="en-US" sz="1400" dirty="0" smtClean="0">
+                <a:solidFill>
+                  <a:srgbClr val="FFFFFF"/>
+                </a:solidFill>
+              </a:rPr>
+              <a:t> - What </a:t>
+            </a:r>
+            <a:r>
+              <a:rPr lang="en-US" sz="1400" dirty="0">
+                <a:solidFill>
+                  <a:srgbClr val="FFFFFF"/>
+                </a:solidFill>
+              </a:rPr>
+              <a:t>is </a:t>
+            </a:r>
+            <a:r>
+              <a:rPr lang="en-US" sz="1400" dirty="0" smtClean="0">
+                <a:solidFill>
+                  <a:srgbClr val="FFFFFF"/>
+                </a:solidFill>
+              </a:rPr>
+              <a:t>the heavy </a:t>
+            </a:r>
+            <a:r>
+              <a:rPr lang="en-US" sz="1400" dirty="0">
+                <a:solidFill>
+                  <a:srgbClr val="FFFFFF"/>
+                </a:solidFill>
+              </a:rPr>
+              <a:t>period in </a:t>
+            </a:r>
+            <a:r>
+              <a:rPr lang="en-US" sz="1400" dirty="0" smtClean="0">
+                <a:solidFill>
+                  <a:srgbClr val="FFFFFF"/>
+                </a:solidFill>
+              </a:rPr>
+              <a:t>the year </a:t>
+            </a:r>
+            <a:r>
+              <a:rPr lang="en-US" sz="1400" dirty="0">
+                <a:solidFill>
+                  <a:srgbClr val="FFFFFF"/>
+                </a:solidFill>
+              </a:rPr>
+              <a:t>for traffic citations</a:t>
+            </a:r>
+            <a:r>
+              <a:rPr lang="en-US" sz="1400" dirty="0" smtClean="0">
+                <a:solidFill>
+                  <a:srgbClr val="FFFFFF"/>
+                </a:solidFill>
+              </a:rPr>
+              <a:t>? Thanks Giving, Christmas, or any of the long weekends?</a:t>
+            </a:r>
+          </a:p>
+          <a:p>
+            <a:pPr>
+              <a:spcBef>
+                <a:spcPts val="1500"/>
+              </a:spcBef>
+            </a:pPr>
+            <a:r>
+              <a:rPr lang="en-US" sz="1400" dirty="0" smtClean="0">
+                <a:solidFill>
+                  <a:srgbClr val="FFFFFF"/>
+                </a:solidFill>
+              </a:rPr>
+              <a:t>Michael - What </a:t>
+            </a:r>
+            <a:r>
+              <a:rPr lang="en-US" sz="1400" dirty="0" smtClean="0">
+                <a:solidFill>
+                  <a:srgbClr val="FFFFFF"/>
+                </a:solidFill>
+              </a:rPr>
+              <a:t>is the breakdown of the citations by offense type? Speeding, texting, DUI or other?</a:t>
+            </a:r>
+          </a:p>
+          <a:p>
+            <a:pPr>
+              <a:spcBef>
+                <a:spcPts val="1500"/>
+              </a:spcBef>
+            </a:pPr>
+            <a:r>
+              <a:rPr lang="en-US" sz="1400" dirty="0" err="1" smtClean="0">
+                <a:solidFill>
+                  <a:srgbClr val="FFFFFF"/>
+                </a:solidFill>
+              </a:rPr>
+              <a:t>Lalita</a:t>
+            </a:r>
+            <a:r>
+              <a:rPr lang="en-US" sz="1400" dirty="0" smtClean="0">
+                <a:solidFill>
+                  <a:srgbClr val="FFFFFF"/>
+                </a:solidFill>
+              </a:rPr>
+              <a:t> - What </a:t>
+            </a:r>
+            <a:r>
+              <a:rPr lang="en-US" sz="1400" dirty="0" smtClean="0">
+                <a:solidFill>
+                  <a:srgbClr val="FFFFFF"/>
+                </a:solidFill>
+              </a:rPr>
+              <a:t>is the breakdown of citations by police vehicle type?  Marked or unmarked police vehicle, radar or motorcycle cop?</a:t>
+            </a:r>
+          </a:p>
+          <a:p>
+            <a:pPr>
+              <a:spcBef>
+                <a:spcPts val="1500"/>
+              </a:spcBef>
+            </a:pPr>
+            <a:r>
+              <a:rPr lang="en-US" sz="1400" dirty="0" smtClean="0">
+                <a:solidFill>
+                  <a:srgbClr val="FFFFFF"/>
+                </a:solidFill>
+              </a:rPr>
+              <a:t>TBD - What </a:t>
+            </a:r>
+            <a:r>
+              <a:rPr lang="en-US" sz="1400" dirty="0" smtClean="0">
+                <a:solidFill>
+                  <a:srgbClr val="FFFFFF"/>
+                </a:solidFill>
+              </a:rPr>
+              <a:t>is the breakdown of citations by race?</a:t>
+            </a:r>
+          </a:p>
+          <a:p>
+            <a:pPr>
+              <a:spcBef>
+                <a:spcPts val="1500"/>
+              </a:spcBef>
+            </a:pPr>
+            <a:r>
+              <a:rPr lang="en-US" sz="1400" dirty="0" smtClean="0">
+                <a:solidFill>
+                  <a:srgbClr val="FFFFFF"/>
+                </a:solidFill>
+              </a:rPr>
+              <a:t>TBD - Are </a:t>
+            </a:r>
+            <a:r>
+              <a:rPr lang="en-US" sz="1400" dirty="0" smtClean="0">
+                <a:solidFill>
+                  <a:srgbClr val="FFFFFF"/>
+                </a:solidFill>
+              </a:rPr>
+              <a:t>the odds higher when driving a newer car  and does it decrease as the car gets older?</a:t>
+            </a:r>
+          </a:p>
+          <a:p>
+            <a:pPr>
+              <a:spcBef>
+                <a:spcPts val="1500"/>
+              </a:spcBef>
+            </a:pPr>
+            <a:endParaRPr lang="en-US" sz="1400" dirty="0" smtClean="0">
+              <a:solidFill>
+                <a:srgbClr val="FFFFFF"/>
+              </a:solidFill>
+            </a:endParaRPr>
+          </a:p>
+          <a:p>
+            <a:pPr>
+              <a:spcBef>
+                <a:spcPts val="1500"/>
+              </a:spcBef>
+            </a:pPr>
+            <a:endParaRPr lang="en-US" sz="1400" dirty="0">
+              <a:solidFill>
+                <a:srgbClr val="FFFFFF"/>
+              </a:solidFill>
+            </a:endParaRPr>
           </a:p>
         </p:txBody>
       </p:sp>
     </p:spTree>
     <p:extLst>
       <p:ext uri="{BB962C8B-B14F-4D97-AF65-F5344CB8AC3E}">
-        <p14:creationId xmlns:p14="http://schemas.microsoft.com/office/powerpoint/2010/main" val="2694165144"/>
+        <p14:creationId xmlns:p14="http://schemas.microsoft.com/office/powerpoint/2010/main" val="1476695525"/>
       </p:ext>
     </p:extLst>
   </p:cSld>
   <p:clrMapOvr>
     <a:masterClrMapping/>
   </p:clrMapOvr>
+  <mc:AlternateContent xmlns:mc="http://schemas.openxmlformats.org/markup-compatibility/2006" xmlns:p14="http://schemas.microsoft.com/office/powerpoint/2010/main">
+    <mc:Choice Requires="p14">
+      <p:transition spd="slow" p14:dur="2000"/>
+    </mc:Choice>
+    <mc:Fallback xmlns="">
+      <p:transition xmlns:p14="http://schemas.microsoft.com/office/powerpoint/2010/main" spd="slow"/>
+    </mc:Fallback>
+  </mc:AlternateContent>
   <p:timing>
     <p:tnLst>
       <p:par>

</xml_diff>